<commit_message>
Presentation update. Wireframes upload
</commit_message>
<xml_diff>
--- a/Documents/StudyHUB_by_FireDucks.pptx
+++ b/Documents/StudyHUB_by_FireDucks.pptx
@@ -15,7 +15,8 @@
     <p:sldId id="266" r:id="rId9"/>
     <p:sldId id="267" r:id="rId10"/>
     <p:sldId id="268" r:id="rId11"/>
-    <p:sldId id="262" r:id="rId12"/>
+    <p:sldId id="269" r:id="rId12"/>
+    <p:sldId id="262" r:id="rId13"/>
   </p:sldIdLst>
   <p:sldSz cx="12192000" cy="6858000"/>
   <p:notesSz cx="6858000" cy="9144000"/>
@@ -1333,7 +1334,7 @@
           <a:p>
             <a:fld id="{19C16BAB-C0AE-4E6F-AE2E-051449563986}" type="datetimeFigureOut">
               <a:rPr lang="uk-UA" smtClean="0"/>
-              <a:t>16.09.2025</a:t>
+              <a:t>23.09.2025</a:t>
             </a:fld>
             <a:endParaRPr lang="uk-UA"/>
           </a:p>
@@ -1571,7 +1572,7 @@
           <a:p>
             <a:fld id="{19C16BAB-C0AE-4E6F-AE2E-051449563986}" type="datetimeFigureOut">
               <a:rPr lang="uk-UA" smtClean="0"/>
-              <a:t>16.09.2025</a:t>
+              <a:t>23.09.2025</a:t>
             </a:fld>
             <a:endParaRPr lang="uk-UA"/>
           </a:p>
@@ -1751,7 +1752,7 @@
           <a:p>
             <a:fld id="{19C16BAB-C0AE-4E6F-AE2E-051449563986}" type="datetimeFigureOut">
               <a:rPr lang="uk-UA" smtClean="0"/>
-              <a:t>16.09.2025</a:t>
+              <a:t>23.09.2025</a:t>
             </a:fld>
             <a:endParaRPr lang="uk-UA"/>
           </a:p>
@@ -1921,7 +1922,7 @@
           <a:p>
             <a:fld id="{19C16BAB-C0AE-4E6F-AE2E-051449563986}" type="datetimeFigureOut">
               <a:rPr lang="uk-UA" smtClean="0"/>
-              <a:t>16.09.2025</a:t>
+              <a:t>23.09.2025</a:t>
             </a:fld>
             <a:endParaRPr lang="uk-UA"/>
           </a:p>
@@ -2197,7 +2198,7 @@
           <a:p>
             <a:fld id="{19C16BAB-C0AE-4E6F-AE2E-051449563986}" type="datetimeFigureOut">
               <a:rPr lang="uk-UA" smtClean="0"/>
-              <a:t>16.09.2025</a:t>
+              <a:t>23.09.2025</a:t>
             </a:fld>
             <a:endParaRPr lang="uk-UA"/>
           </a:p>
@@ -3398,7 +3399,7 @@
           <a:p>
             <a:fld id="{19C16BAB-C0AE-4E6F-AE2E-051449563986}" type="datetimeFigureOut">
               <a:rPr lang="uk-UA" smtClean="0"/>
-              <a:t>16.09.2025</a:t>
+              <a:t>23.09.2025</a:t>
             </a:fld>
             <a:endParaRPr lang="uk-UA"/>
           </a:p>
@@ -3788,7 +3789,7 @@
           <a:p>
             <a:fld id="{19C16BAB-C0AE-4E6F-AE2E-051449563986}" type="datetimeFigureOut">
               <a:rPr lang="uk-UA" smtClean="0"/>
-              <a:t>16.09.2025</a:t>
+              <a:t>23.09.2025</a:t>
             </a:fld>
             <a:endParaRPr lang="uk-UA"/>
           </a:p>
@@ -3911,7 +3912,7 @@
           <a:p>
             <a:fld id="{19C16BAB-C0AE-4E6F-AE2E-051449563986}" type="datetimeFigureOut">
               <a:rPr lang="uk-UA" smtClean="0"/>
-              <a:t>16.09.2025</a:t>
+              <a:t>23.09.2025</a:t>
             </a:fld>
             <a:endParaRPr lang="uk-UA"/>
           </a:p>
@@ -4006,7 +4007,7 @@
           <a:p>
             <a:fld id="{19C16BAB-C0AE-4E6F-AE2E-051449563986}" type="datetimeFigureOut">
               <a:rPr lang="uk-UA" smtClean="0"/>
-              <a:t>16.09.2025</a:t>
+              <a:t>23.09.2025</a:t>
             </a:fld>
             <a:endParaRPr lang="uk-UA"/>
           </a:p>
@@ -4769,7 +4770,7 @@
           <a:p>
             <a:fld id="{19C16BAB-C0AE-4E6F-AE2E-051449563986}" type="datetimeFigureOut">
               <a:rPr lang="uk-UA" smtClean="0"/>
-              <a:t>16.09.2025</a:t>
+              <a:t>23.09.2025</a:t>
             </a:fld>
             <a:endParaRPr lang="uk-UA"/>
           </a:p>
@@ -5609,7 +5610,7 @@
           <a:p>
             <a:fld id="{19C16BAB-C0AE-4E6F-AE2E-051449563986}" type="datetimeFigureOut">
               <a:rPr lang="uk-UA" smtClean="0"/>
-              <a:t>16.09.2025</a:t>
+              <a:t>23.09.2025</a:t>
             </a:fld>
             <a:endParaRPr lang="uk-UA"/>
           </a:p>
@@ -5836,7 +5837,7 @@
           <a:p>
             <a:fld id="{19C16BAB-C0AE-4E6F-AE2E-051449563986}" type="datetimeFigureOut">
               <a:rPr lang="uk-UA" smtClean="0"/>
-              <a:t>16.09.2025</a:t>
+              <a:t>23.09.2025</a:t>
             </a:fld>
             <a:endParaRPr lang="uk-UA"/>
           </a:p>
@@ -7127,7 +7128,19 @@
             </a:r>
             <a:r>
               <a:rPr lang="en-US" b="1" dirty="0"/>
-              <a:t>– THIS BOT WAS AN ATTEMPT TO HELP STUDENTS WITH SCHEDULES, BUT IT HAD POOR IMPLEMENTATION, CRASHED ON LAUNCH DAY, AND HASN’T BEEN SUPPORTED SINCE.</a:t>
+              <a:t>– THIS BOT W</a:t>
+            </a:r>
+            <a:r>
+              <a:rPr lang="en-US" b="1" dirty="0">
+                <a:solidFill>
+                  <a:srgbClr val="55799A"/>
+                </a:solidFill>
+              </a:rPr>
+              <a:t>AS </a:t>
+            </a:r>
+            <a:r>
+              <a:rPr lang="en-US" b="1" dirty="0"/>
+              <a:t>AN ATTEMPT TO HELP STUDENTS WITH SCHEDULES, BUT IT HAD POOR IMPLEMENTATION, CRASHED ON LAUNCH DAY, AND HASN’T BEEN SUPPORTED SINCE.</a:t>
             </a:r>
           </a:p>
         </p:txBody>
@@ -7205,6 +7218,659 @@
 </file>
 
 <file path=ppt/slides/slide11.xml><?xml version="1.0" encoding="utf-8"?>
+<p:sld xmlns:a="http://schemas.openxmlformats.org/drawingml/2006/main" xmlns:r="http://schemas.openxmlformats.org/officeDocument/2006/relationships" xmlns:p="http://schemas.openxmlformats.org/presentationml/2006/main">
+  <p:cSld>
+    <p:spTree>
+      <p:nvGrpSpPr>
+        <p:cNvPr id="1" name=""/>
+        <p:cNvGrpSpPr/>
+        <p:nvPr/>
+      </p:nvGrpSpPr>
+      <p:grpSpPr>
+        <a:xfrm>
+          <a:off x="0" y="0"/>
+          <a:ext cx="0" cy="0"/>
+          <a:chOff x="0" y="0"/>
+          <a:chExt cx="0" cy="0"/>
+        </a:xfrm>
+      </p:grpSpPr>
+      <p:sp>
+        <p:nvSpPr>
+          <p:cNvPr id="2" name="Заголовок 1">
+            <a:extLst>
+              <a:ext uri="{FF2B5EF4-FFF2-40B4-BE49-F238E27FC236}">
+                <a16:creationId xmlns:a16="http://schemas.microsoft.com/office/drawing/2014/main" id="{47547829-DE7D-4DFE-8766-E0F0C9933C2C}"/>
+              </a:ext>
+            </a:extLst>
+          </p:cNvPr>
+          <p:cNvSpPr>
+            <a:spLocks noGrp="1"/>
+          </p:cNvSpPr>
+          <p:nvPr>
+            <p:ph type="title"/>
+          </p:nvPr>
+        </p:nvSpPr>
+        <p:spPr/>
+        <p:txBody>
+          <a:bodyPr/>
+          <a:lstStyle/>
+          <a:p>
+            <a:r>
+              <a:rPr lang="en-US" dirty="0"/>
+              <a:t>Why is </a:t>
+            </a:r>
+            <a:r>
+              <a:rPr lang="en-US" dirty="0" err="1">
+                <a:solidFill>
+                  <a:srgbClr val="2888BB"/>
+                </a:solidFill>
+              </a:rPr>
+              <a:t>Study</a:t>
+            </a:r>
+            <a:r>
+              <a:rPr lang="en-US" dirty="0" err="1">
+                <a:solidFill>
+                  <a:schemeClr val="accent6"/>
+                </a:solidFill>
+              </a:rPr>
+              <a:t>Hub</a:t>
+            </a:r>
+            <a:r>
+              <a:rPr lang="en-US" dirty="0"/>
+              <a:t> </a:t>
+            </a:r>
+            <a:r>
+              <a:rPr lang="en-US" u="sng" dirty="0"/>
+              <a:t>better</a:t>
+            </a:r>
+            <a:r>
+              <a:rPr lang="en-US" dirty="0"/>
+              <a:t>?</a:t>
+            </a:r>
+            <a:endParaRPr lang="uk-UA" dirty="0"/>
+          </a:p>
+        </p:txBody>
+      </p:sp>
+      <p:pic>
+        <p:nvPicPr>
+          <p:cNvPr id="1026" name="Picture 2">
+            <a:extLst>
+              <a:ext uri="{FF2B5EF4-FFF2-40B4-BE49-F238E27FC236}">
+                <a16:creationId xmlns:a16="http://schemas.microsoft.com/office/drawing/2014/main" id="{4A9836FF-FA92-4842-AFA6-77166CED29E3}"/>
+              </a:ext>
+            </a:extLst>
+          </p:cNvPr>
+          <p:cNvPicPr>
+            <a:picLocks noChangeAspect="1" noChangeArrowheads="1"/>
+          </p:cNvPicPr>
+          <p:nvPr/>
+        </p:nvPicPr>
+        <p:blipFill>
+          <a:blip r:embed="rId2">
+            <a:extLst>
+              <a:ext uri="{28A0092B-C50C-407E-A947-70E740481C1C}">
+                <a14:useLocalDpi xmlns:a14="http://schemas.microsoft.com/office/drawing/2010/main" val="0"/>
+              </a:ext>
+            </a:extLst>
+          </a:blip>
+          <a:srcRect/>
+          <a:stretch>
+            <a:fillRect/>
+          </a:stretch>
+        </p:blipFill>
+        <p:spPr bwMode="auto">
+          <a:xfrm>
+            <a:off x="1568622" y="1526530"/>
+            <a:ext cx="964854" cy="898312"/>
+          </a:xfrm>
+          <a:prstGeom prst="rect">
+            <a:avLst/>
+          </a:prstGeom>
+          <a:noFill/>
+          <a:extLst>
+            <a:ext uri="{909E8E84-426E-40DD-AFC4-6F175D3DCCD1}">
+              <a14:hiddenFill xmlns:a14="http://schemas.microsoft.com/office/drawing/2010/main">
+                <a:solidFill>
+                  <a:srgbClr val="FFFFFF"/>
+                </a:solidFill>
+              </a14:hiddenFill>
+            </a:ext>
+          </a:extLst>
+        </p:spPr>
+      </p:pic>
+      <p:pic>
+        <p:nvPicPr>
+          <p:cNvPr id="1028" name="Picture 4" descr="Moodle color icon in PNG, SVG">
+            <a:extLst>
+              <a:ext uri="{FF2B5EF4-FFF2-40B4-BE49-F238E27FC236}">
+                <a16:creationId xmlns:a16="http://schemas.microsoft.com/office/drawing/2014/main" id="{5BBAE15F-E75D-4B26-AE69-50A1A3A850DE}"/>
+              </a:ext>
+            </a:extLst>
+          </p:cNvPr>
+          <p:cNvPicPr>
+            <a:picLocks noChangeAspect="1" noChangeArrowheads="1"/>
+          </p:cNvPicPr>
+          <p:nvPr/>
+        </p:nvPicPr>
+        <p:blipFill>
+          <a:blip r:embed="rId3">
+            <a:extLst>
+              <a:ext uri="{28A0092B-C50C-407E-A947-70E740481C1C}">
+                <a14:useLocalDpi xmlns:a14="http://schemas.microsoft.com/office/drawing/2010/main" val="0"/>
+              </a:ext>
+            </a:extLst>
+          </a:blip>
+          <a:srcRect/>
+          <a:stretch>
+            <a:fillRect/>
+          </a:stretch>
+        </p:blipFill>
+        <p:spPr bwMode="auto">
+          <a:xfrm>
+            <a:off x="4998385" y="1220365"/>
+            <a:ext cx="1492132" cy="1510642"/>
+          </a:xfrm>
+          <a:prstGeom prst="rect">
+            <a:avLst/>
+          </a:prstGeom>
+          <a:noFill/>
+          <a:extLst>
+            <a:ext uri="{909E8E84-426E-40DD-AFC4-6F175D3DCCD1}">
+              <a14:hiddenFill xmlns:a14="http://schemas.microsoft.com/office/drawing/2010/main">
+                <a:solidFill>
+                  <a:srgbClr val="FFFFFF"/>
+                </a:solidFill>
+              </a14:hiddenFill>
+            </a:ext>
+          </a:extLst>
+        </p:spPr>
+      </p:pic>
+      <p:pic>
+        <p:nvPicPr>
+          <p:cNvPr id="1036" name="Picture 12" descr="Github - Free social media icons">
+            <a:extLst>
+              <a:ext uri="{FF2B5EF4-FFF2-40B4-BE49-F238E27FC236}">
+                <a16:creationId xmlns:a16="http://schemas.microsoft.com/office/drawing/2014/main" id="{6891AF21-7C76-4342-9123-3E74107182AD}"/>
+              </a:ext>
+            </a:extLst>
+          </p:cNvPr>
+          <p:cNvPicPr>
+            <a:picLocks noChangeAspect="1" noChangeArrowheads="1"/>
+          </p:cNvPicPr>
+          <p:nvPr/>
+        </p:nvPicPr>
+        <p:blipFill>
+          <a:blip r:embed="rId4">
+            <a:extLst>
+              <a:ext uri="{28A0092B-C50C-407E-A947-70E740481C1C}">
+                <a14:useLocalDpi xmlns:a14="http://schemas.microsoft.com/office/drawing/2010/main" val="0"/>
+              </a:ext>
+            </a:extLst>
+          </a:blip>
+          <a:srcRect/>
+          <a:stretch>
+            <a:fillRect/>
+          </a:stretch>
+        </p:blipFill>
+        <p:spPr bwMode="auto">
+          <a:xfrm>
+            <a:off x="8801590" y="1432019"/>
+            <a:ext cx="1087334" cy="1087334"/>
+          </a:xfrm>
+          <a:prstGeom prst="rect">
+            <a:avLst/>
+          </a:prstGeom>
+          <a:noFill/>
+          <a:extLst>
+            <a:ext uri="{909E8E84-426E-40DD-AFC4-6F175D3DCCD1}">
+              <a14:hiddenFill xmlns:a14="http://schemas.microsoft.com/office/drawing/2010/main">
+                <a:solidFill>
+                  <a:srgbClr val="FFFFFF"/>
+                </a:solidFill>
+              </a14:hiddenFill>
+            </a:ext>
+          </a:extLst>
+        </p:spPr>
+      </p:pic>
+      <p:sp>
+        <p:nvSpPr>
+          <p:cNvPr id="8" name="Прямокутник 7">
+            <a:extLst>
+              <a:ext uri="{FF2B5EF4-FFF2-40B4-BE49-F238E27FC236}">
+                <a16:creationId xmlns:a16="http://schemas.microsoft.com/office/drawing/2014/main" id="{352AF9D4-019D-4F26-BAF6-0132FA9DF250}"/>
+              </a:ext>
+            </a:extLst>
+          </p:cNvPr>
+          <p:cNvSpPr/>
+          <p:nvPr/>
+        </p:nvSpPr>
+        <p:spPr>
+          <a:xfrm>
+            <a:off x="2637486" y="2112560"/>
+            <a:ext cx="1111202" cy="369332"/>
+          </a:xfrm>
+          <a:prstGeom prst="rect">
+            <a:avLst/>
+          </a:prstGeom>
+        </p:spPr>
+        <p:txBody>
+          <a:bodyPr wrap="none">
+            <a:spAutoFit/>
+          </a:bodyPr>
+          <a:lstStyle/>
+          <a:p>
+            <a:r>
+              <a:rPr lang="en-US" dirty="0">
+                <a:latin typeface="+mj-lt"/>
+              </a:rPr>
+              <a:t>MS TEAMS</a:t>
+            </a:r>
+            <a:endParaRPr lang="uk-UA" dirty="0">
+              <a:latin typeface="+mj-lt"/>
+            </a:endParaRPr>
+          </a:p>
+        </p:txBody>
+      </p:sp>
+      <p:sp>
+        <p:nvSpPr>
+          <p:cNvPr id="13" name="Прямокутник 12">
+            <a:extLst>
+              <a:ext uri="{FF2B5EF4-FFF2-40B4-BE49-F238E27FC236}">
+                <a16:creationId xmlns:a16="http://schemas.microsoft.com/office/drawing/2014/main" id="{3D6947EF-5E62-47F5-B4E6-B78C16BBB54B}"/>
+              </a:ext>
+            </a:extLst>
+          </p:cNvPr>
+          <p:cNvSpPr/>
+          <p:nvPr/>
+        </p:nvSpPr>
+        <p:spPr>
+          <a:xfrm>
+            <a:off x="6490517" y="2112560"/>
+            <a:ext cx="915635" cy="369332"/>
+          </a:xfrm>
+          <a:prstGeom prst="rect">
+            <a:avLst/>
+          </a:prstGeom>
+        </p:spPr>
+        <p:txBody>
+          <a:bodyPr wrap="none">
+            <a:spAutoFit/>
+          </a:bodyPr>
+          <a:lstStyle/>
+          <a:p>
+            <a:r>
+              <a:rPr lang="en-US" dirty="0">
+                <a:latin typeface="+mj-lt"/>
+              </a:rPr>
+              <a:t>MOODLE</a:t>
+            </a:r>
+            <a:endParaRPr lang="uk-UA" dirty="0">
+              <a:latin typeface="+mj-lt"/>
+            </a:endParaRPr>
+          </a:p>
+        </p:txBody>
+      </p:sp>
+      <p:sp>
+        <p:nvSpPr>
+          <p:cNvPr id="14" name="Прямокутник 13">
+            <a:extLst>
+              <a:ext uri="{FF2B5EF4-FFF2-40B4-BE49-F238E27FC236}">
+                <a16:creationId xmlns:a16="http://schemas.microsoft.com/office/drawing/2014/main" id="{5357A257-A639-42C0-935F-19E6873E8E60}"/>
+              </a:ext>
+            </a:extLst>
+          </p:cNvPr>
+          <p:cNvSpPr/>
+          <p:nvPr/>
+        </p:nvSpPr>
+        <p:spPr>
+          <a:xfrm>
+            <a:off x="9989592" y="2112560"/>
+            <a:ext cx="906017" cy="369332"/>
+          </a:xfrm>
+          <a:prstGeom prst="rect">
+            <a:avLst/>
+          </a:prstGeom>
+        </p:spPr>
+        <p:txBody>
+          <a:bodyPr wrap="none">
+            <a:spAutoFit/>
+          </a:bodyPr>
+          <a:lstStyle/>
+          <a:p>
+            <a:r>
+              <a:rPr lang="en-US" dirty="0">
+                <a:latin typeface="+mj-lt"/>
+              </a:rPr>
+              <a:t>GIT HUB</a:t>
+            </a:r>
+            <a:endParaRPr lang="uk-UA" dirty="0">
+              <a:latin typeface="+mj-lt"/>
+            </a:endParaRPr>
+          </a:p>
+        </p:txBody>
+      </p:sp>
+      <p:sp>
+        <p:nvSpPr>
+          <p:cNvPr id="10" name="Прямокутник 9">
+            <a:extLst>
+              <a:ext uri="{FF2B5EF4-FFF2-40B4-BE49-F238E27FC236}">
+                <a16:creationId xmlns:a16="http://schemas.microsoft.com/office/drawing/2014/main" id="{F9DA81E4-8261-45C9-A4FB-DC7FE98575F8}"/>
+              </a:ext>
+            </a:extLst>
+          </p:cNvPr>
+          <p:cNvSpPr/>
+          <p:nvPr/>
+        </p:nvSpPr>
+        <p:spPr>
+          <a:xfrm>
+            <a:off x="886114" y="2749256"/>
+            <a:ext cx="3169459" cy="2585323"/>
+          </a:xfrm>
+          <a:prstGeom prst="rect">
+            <a:avLst/>
+          </a:prstGeom>
+        </p:spPr>
+        <p:txBody>
+          <a:bodyPr wrap="square">
+            <a:spAutoFit/>
+          </a:bodyPr>
+          <a:lstStyle/>
+          <a:p>
+            <a:r>
+              <a:rPr lang="en-US" b="1" dirty="0">
+                <a:solidFill>
+                  <a:srgbClr val="55799A"/>
+                </a:solidFill>
+              </a:rPr>
+              <a:t>+ DEADLINE REMINDERS</a:t>
+            </a:r>
+          </a:p>
+          <a:p>
+            <a:r>
+              <a:rPr lang="en-US" b="1" dirty="0">
+                <a:solidFill>
+                  <a:srgbClr val="55799A"/>
+                </a:solidFill>
+              </a:rPr>
+              <a:t>+ FILE STORAGE</a:t>
+            </a:r>
+          </a:p>
+          <a:p>
+            <a:r>
+              <a:rPr lang="en-US" b="1" dirty="0">
+                <a:solidFill>
+                  <a:srgbClr val="55799A"/>
+                </a:solidFill>
+              </a:rPr>
+              <a:t>+ CALENDAR</a:t>
+            </a:r>
+            <a:br>
+              <a:rPr lang="en-US" b="1" dirty="0">
+                <a:solidFill>
+                  <a:srgbClr val="55799A"/>
+                </a:solidFill>
+              </a:rPr>
+            </a:br>
+            <a:endParaRPr lang="en-US" b="1" dirty="0">
+              <a:solidFill>
+                <a:srgbClr val="55799A"/>
+              </a:solidFill>
+            </a:endParaRPr>
+          </a:p>
+          <a:p>
+            <a:r>
+              <a:rPr lang="en-US" b="1" dirty="0">
+                <a:solidFill>
+                  <a:srgbClr val="55799A"/>
+                </a:solidFill>
+              </a:rPr>
+              <a:t>– NO KANBAN BOARD FOR TASK MANAGEMENT</a:t>
+            </a:r>
+          </a:p>
+          <a:p>
+            <a:r>
+              <a:rPr lang="en-US" b="1" dirty="0">
+                <a:solidFill>
+                  <a:srgbClr val="55799A"/>
+                </a:solidFill>
+              </a:rPr>
+              <a:t>– SCHEDULE CANNOT BE USED IN CONVENIENT FORMAT</a:t>
+            </a:r>
+            <a:endParaRPr lang="uk-UA" b="1" dirty="0">
+              <a:solidFill>
+                <a:srgbClr val="55799A"/>
+              </a:solidFill>
+            </a:endParaRPr>
+          </a:p>
+        </p:txBody>
+      </p:sp>
+      <p:sp>
+        <p:nvSpPr>
+          <p:cNvPr id="17" name="Прямокутник 16">
+            <a:extLst>
+              <a:ext uri="{FF2B5EF4-FFF2-40B4-BE49-F238E27FC236}">
+                <a16:creationId xmlns:a16="http://schemas.microsoft.com/office/drawing/2014/main" id="{28CA8BFF-DA23-49E1-B7A1-791B7C411237}"/>
+              </a:ext>
+            </a:extLst>
+          </p:cNvPr>
+          <p:cNvSpPr/>
+          <p:nvPr/>
+        </p:nvSpPr>
+        <p:spPr>
+          <a:xfrm>
+            <a:off x="4264022" y="2731007"/>
+            <a:ext cx="4160939" cy="3693319"/>
+          </a:xfrm>
+          <a:prstGeom prst="rect">
+            <a:avLst/>
+          </a:prstGeom>
+        </p:spPr>
+        <p:txBody>
+          <a:bodyPr wrap="square">
+            <a:spAutoFit/>
+          </a:bodyPr>
+          <a:lstStyle/>
+          <a:p>
+            <a:r>
+              <a:rPr lang="en-US" b="1" dirty="0">
+                <a:solidFill>
+                  <a:srgbClr val="55799A"/>
+                </a:solidFill>
+              </a:rPr>
+              <a:t>+ CALENDAR WITH DEADLINES AND EVENTS</a:t>
+            </a:r>
+          </a:p>
+          <a:p>
+            <a:r>
+              <a:rPr lang="en-US" b="1" dirty="0">
+                <a:solidFill>
+                  <a:srgbClr val="55799A"/>
+                </a:solidFill>
+              </a:rPr>
+              <a:t>+ CONVENIENT FOR ADDING LEARNING MATERIALS AND ASSIGMENTS</a:t>
+            </a:r>
+          </a:p>
+          <a:p>
+            <a:r>
+              <a:rPr lang="en-US" b="1" dirty="0">
+                <a:solidFill>
+                  <a:srgbClr val="55799A"/>
+                </a:solidFill>
+              </a:rPr>
+              <a:t>+ PROGRESS TRACKING AVAILABLE</a:t>
+            </a:r>
+          </a:p>
+          <a:p>
+            <a:endParaRPr lang="en-US" b="1" dirty="0">
+              <a:solidFill>
+                <a:srgbClr val="55799A"/>
+              </a:solidFill>
+            </a:endParaRPr>
+          </a:p>
+          <a:p>
+            <a:r>
+              <a:rPr lang="en-US" b="1" dirty="0">
+                <a:solidFill>
+                  <a:srgbClr val="55799A"/>
+                </a:solidFill>
+              </a:rPr>
+              <a:t>– NO BUILT-IN KANBAN BOARD</a:t>
+            </a:r>
+          </a:p>
+          <a:p>
+            <a:r>
+              <a:rPr lang="en-US" b="1" dirty="0">
+                <a:solidFill>
+                  <a:srgbClr val="55799A"/>
+                </a:solidFill>
+              </a:rPr>
+              <a:t>– LIMITED FILE STORAGE</a:t>
+            </a:r>
+          </a:p>
+          <a:p>
+            <a:r>
+              <a:rPr lang="en-US" b="1" dirty="0">
+                <a:solidFill>
+                  <a:srgbClr val="55799A"/>
+                </a:solidFill>
+              </a:rPr>
+              <a:t>– LESS CONVENIENT INTERFACE FOR STUDENTS COMPARED TO </a:t>
+            </a:r>
+            <a:r>
+              <a:rPr lang="en-US" b="1" dirty="0">
+                <a:solidFill>
+                  <a:srgbClr val="2888BB"/>
+                </a:solidFill>
+                <a:effectLst>
+                  <a:outerShdw blurRad="38100" dist="38100" dir="2700000" algn="tl">
+                    <a:srgbClr val="000000">
+                      <a:alpha val="43137"/>
+                    </a:srgbClr>
+                  </a:outerShdw>
+                </a:effectLst>
+              </a:rPr>
+              <a:t>STUDY</a:t>
+            </a:r>
+            <a:r>
+              <a:rPr lang="en-US" b="1" dirty="0">
+                <a:solidFill>
+                  <a:schemeClr val="accent6"/>
+                </a:solidFill>
+                <a:effectLst>
+                  <a:outerShdw blurRad="38100" dist="38100" dir="2700000" algn="tl">
+                    <a:srgbClr val="000000">
+                      <a:alpha val="43137"/>
+                    </a:srgbClr>
+                  </a:outerShdw>
+                </a:effectLst>
+              </a:rPr>
+              <a:t>HUB</a:t>
+            </a:r>
+            <a:endParaRPr lang="uk-UA" dirty="0">
+              <a:solidFill>
+                <a:srgbClr val="046D9A"/>
+              </a:solidFill>
+              <a:latin typeface="+mj-lt"/>
+            </a:endParaRPr>
+          </a:p>
+        </p:txBody>
+      </p:sp>
+      <p:sp>
+        <p:nvSpPr>
+          <p:cNvPr id="18" name="Прямокутник 17">
+            <a:extLst>
+              <a:ext uri="{FF2B5EF4-FFF2-40B4-BE49-F238E27FC236}">
+                <a16:creationId xmlns:a16="http://schemas.microsoft.com/office/drawing/2014/main" id="{AE680D45-4B08-4150-8C25-9AAFAFB9F496}"/>
+              </a:ext>
+            </a:extLst>
+          </p:cNvPr>
+          <p:cNvSpPr/>
+          <p:nvPr/>
+        </p:nvSpPr>
+        <p:spPr>
+          <a:xfrm>
+            <a:off x="8633410" y="2731007"/>
+            <a:ext cx="3169459" cy="1754326"/>
+          </a:xfrm>
+          <a:prstGeom prst="rect">
+            <a:avLst/>
+          </a:prstGeom>
+        </p:spPr>
+        <p:txBody>
+          <a:bodyPr wrap="square">
+            <a:spAutoFit/>
+          </a:bodyPr>
+          <a:lstStyle/>
+          <a:p>
+            <a:r>
+              <a:rPr lang="en-US" b="1" dirty="0">
+                <a:solidFill>
+                  <a:srgbClr val="55799A"/>
+                </a:solidFill>
+              </a:rPr>
+              <a:t>+ KANBAN BOARD </a:t>
+            </a:r>
+          </a:p>
+          <a:p>
+            <a:r>
+              <a:rPr lang="en-US" b="1" dirty="0">
+                <a:solidFill>
+                  <a:srgbClr val="55799A"/>
+                </a:solidFill>
+              </a:rPr>
+              <a:t>+ REPOSITORIES FOR FILES STORAGE</a:t>
+            </a:r>
+          </a:p>
+          <a:p>
+            <a:endParaRPr lang="en-US" b="1" dirty="0">
+              <a:solidFill>
+                <a:srgbClr val="55799A"/>
+              </a:solidFill>
+            </a:endParaRPr>
+          </a:p>
+          <a:p>
+            <a:r>
+              <a:rPr lang="en-US" b="1" dirty="0">
+                <a:solidFill>
+                  <a:srgbClr val="55799A"/>
+                </a:solidFill>
+              </a:rPr>
+              <a:t>– NO CALENDAR OR SCHEDULE</a:t>
+            </a:r>
+            <a:endParaRPr lang="uk-UA" b="1" dirty="0">
+              <a:solidFill>
+                <a:srgbClr val="55799A"/>
+              </a:solidFill>
+            </a:endParaRPr>
+          </a:p>
+        </p:txBody>
+      </p:sp>
+    </p:spTree>
+    <p:extLst>
+      <p:ext uri="{BB962C8B-B14F-4D97-AF65-F5344CB8AC3E}">
+        <p14:creationId xmlns:p14="http://schemas.microsoft.com/office/powerpoint/2010/main" val="4038895530"/>
+      </p:ext>
+    </p:extLst>
+  </p:cSld>
+  <p:clrMapOvr>
+    <a:masterClrMapping/>
+  </p:clrMapOvr>
+  <mc:AlternateContent xmlns:mc="http://schemas.openxmlformats.org/markup-compatibility/2006">
+    <mc:Choice xmlns:p159="http://schemas.microsoft.com/office/powerpoint/2015/09/main" Requires="p159">
+      <p:transition xmlns:p14="http://schemas.microsoft.com/office/powerpoint/2010/main" spd="slow" p14:dur="2000">
+        <p159:morph option="byObject"/>
+      </p:transition>
+    </mc:Choice>
+    <mc:Fallback>
+      <p:transition spd="slow">
+        <p:fade/>
+      </p:transition>
+    </mc:Fallback>
+  </mc:AlternateContent>
+</p:sld>
+</file>
+
+<file path=ppt/slides/slide12.xml><?xml version="1.0" encoding="utf-8"?>
 <p:sld xmlns:a="http://schemas.openxmlformats.org/drawingml/2006/main" xmlns:r="http://schemas.openxmlformats.org/officeDocument/2006/relationships" xmlns:p="http://schemas.openxmlformats.org/presentationml/2006/main">
   <p:cSld>
     <p:spTree>

</xml_diff>